<commit_message>
Upload and presentation done
</commit_message>
<xml_diff>
--- a/Documentation/Presentation_long.pptx
+++ b/Documentation/Presentation_long.pptx
@@ -5,7 +5,7 @@
     <p:sldMasterId id="2147483660" r:id="rId1"/>
   </p:sldMasterIdLst>
   <p:notesMasterIdLst>
-    <p:notesMasterId r:id="rId11"/>
+    <p:notesMasterId r:id="rId14"/>
   </p:notesMasterIdLst>
   <p:sldIdLst>
     <p:sldId id="256" r:id="rId2"/>
@@ -15,8 +15,11 @@
     <p:sldId id="262" r:id="rId6"/>
     <p:sldId id="263" r:id="rId7"/>
     <p:sldId id="261" r:id="rId8"/>
-    <p:sldId id="265" r:id="rId9"/>
-    <p:sldId id="267" r:id="rId10"/>
+    <p:sldId id="268" r:id="rId9"/>
+    <p:sldId id="269" r:id="rId10"/>
+    <p:sldId id="270" r:id="rId11"/>
+    <p:sldId id="271" r:id="rId12"/>
+    <p:sldId id="265" r:id="rId13"/>
   </p:sldIdLst>
   <p:sldSz cx="12192000" cy="6858000"/>
   <p:notesSz cx="6858000" cy="9144000"/>
@@ -6360,6 +6363,654 @@
 </p:sld>
 </file>
 
+<file path=ppt/slides/slide10.xml><?xml version="1.0" encoding="utf-8"?>
+<p:sld xmlns:a="http://schemas.openxmlformats.org/drawingml/2006/main" xmlns:r="http://schemas.openxmlformats.org/officeDocument/2006/relationships" xmlns:p="http://schemas.openxmlformats.org/presentationml/2006/main">
+  <p:cSld>
+    <p:spTree>
+      <p:nvGrpSpPr>
+        <p:cNvPr id="1" name=""/>
+        <p:cNvGrpSpPr/>
+        <p:nvPr/>
+      </p:nvGrpSpPr>
+      <p:grpSpPr>
+        <a:xfrm>
+          <a:off x="0" y="0"/>
+          <a:ext cx="0" cy="0"/>
+          <a:chOff x="0" y="0"/>
+          <a:chExt cx="0" cy="0"/>
+        </a:xfrm>
+      </p:grpSpPr>
+      <p:sp>
+        <p:nvSpPr>
+          <p:cNvPr id="2" name="Title 1">
+            <a:extLst>
+              <a:ext uri="{FF2B5EF4-FFF2-40B4-BE49-F238E27FC236}">
+                <a16:creationId xmlns:a16="http://schemas.microsoft.com/office/drawing/2014/main" id="{95E25BC8-8EA8-D6B0-06B7-2376C8673B62}"/>
+              </a:ext>
+            </a:extLst>
+          </p:cNvPr>
+          <p:cNvSpPr>
+            <a:spLocks noGrp="1"/>
+          </p:cNvSpPr>
+          <p:nvPr>
+            <p:ph type="title"/>
+          </p:nvPr>
+        </p:nvSpPr>
+        <p:spPr>
+          <a:xfrm>
+            <a:off x="618968" y="233463"/>
+            <a:ext cx="8596668" cy="1320800"/>
+          </a:xfrm>
+        </p:spPr>
+        <p:txBody>
+          <a:bodyPr/>
+          <a:lstStyle/>
+          <a:p>
+            <a:r>
+              <a:rPr lang="en-US" dirty="0"/>
+              <a:t>Layout</a:t>
+            </a:r>
+            <a:endParaRPr lang="hu-HU" dirty="0"/>
+          </a:p>
+        </p:txBody>
+      </p:sp>
+      <p:pic>
+        <p:nvPicPr>
+          <p:cNvPr id="5" name="Picture 4">
+            <a:extLst>
+              <a:ext uri="{FF2B5EF4-FFF2-40B4-BE49-F238E27FC236}">
+                <a16:creationId xmlns:a16="http://schemas.microsoft.com/office/drawing/2014/main" id="{F90D8699-5F63-6723-AB95-95BE3599724A}"/>
+              </a:ext>
+            </a:extLst>
+          </p:cNvPr>
+          <p:cNvPicPr>
+            <a:picLocks noChangeAspect="1"/>
+          </p:cNvPicPr>
+          <p:nvPr/>
+        </p:nvPicPr>
+        <p:blipFill>
+          <a:blip r:embed="rId2"/>
+          <a:stretch>
+            <a:fillRect/>
+          </a:stretch>
+        </p:blipFill>
+        <p:spPr>
+          <a:xfrm>
+            <a:off x="6423655" y="972766"/>
+            <a:ext cx="5278719" cy="5414070"/>
+          </a:xfrm>
+          <a:prstGeom prst="rect">
+            <a:avLst/>
+          </a:prstGeom>
+        </p:spPr>
+      </p:pic>
+      <p:pic>
+        <p:nvPicPr>
+          <p:cNvPr id="7" name="Picture 6">
+            <a:extLst>
+              <a:ext uri="{FF2B5EF4-FFF2-40B4-BE49-F238E27FC236}">
+                <a16:creationId xmlns:a16="http://schemas.microsoft.com/office/drawing/2014/main" id="{184B593E-4633-919D-A459-98E76787E14E}"/>
+              </a:ext>
+            </a:extLst>
+          </p:cNvPr>
+          <p:cNvPicPr>
+            <a:picLocks noChangeAspect="1"/>
+          </p:cNvPicPr>
+          <p:nvPr/>
+        </p:nvPicPr>
+        <p:blipFill>
+          <a:blip r:embed="rId3"/>
+          <a:stretch>
+            <a:fillRect/>
+          </a:stretch>
+        </p:blipFill>
+        <p:spPr>
+          <a:xfrm>
+            <a:off x="618968" y="972766"/>
+            <a:ext cx="5415833" cy="5407869"/>
+          </a:xfrm>
+          <a:prstGeom prst="rect">
+            <a:avLst/>
+          </a:prstGeom>
+        </p:spPr>
+      </p:pic>
+    </p:spTree>
+    <p:extLst>
+      <p:ext uri="{BB962C8B-B14F-4D97-AF65-F5344CB8AC3E}">
+        <p14:creationId xmlns:p14="http://schemas.microsoft.com/office/powerpoint/2010/main" val="564210515"/>
+      </p:ext>
+    </p:extLst>
+  </p:cSld>
+  <p:clrMapOvr>
+    <a:masterClrMapping/>
+  </p:clrMapOvr>
+</p:sld>
+</file>
+
+<file path=ppt/slides/slide11.xml><?xml version="1.0" encoding="utf-8"?>
+<p:sld xmlns:a="http://schemas.openxmlformats.org/drawingml/2006/main" xmlns:r="http://schemas.openxmlformats.org/officeDocument/2006/relationships" xmlns:p="http://schemas.openxmlformats.org/presentationml/2006/main">
+  <p:cSld>
+    <p:spTree>
+      <p:nvGrpSpPr>
+        <p:cNvPr id="1" name=""/>
+        <p:cNvGrpSpPr/>
+        <p:nvPr/>
+      </p:nvGrpSpPr>
+      <p:grpSpPr>
+        <a:xfrm>
+          <a:off x="0" y="0"/>
+          <a:ext cx="0" cy="0"/>
+          <a:chOff x="0" y="0"/>
+          <a:chExt cx="0" cy="0"/>
+        </a:xfrm>
+      </p:grpSpPr>
+      <p:sp>
+        <p:nvSpPr>
+          <p:cNvPr id="2" name="Title 1">
+            <a:extLst>
+              <a:ext uri="{FF2B5EF4-FFF2-40B4-BE49-F238E27FC236}">
+                <a16:creationId xmlns:a16="http://schemas.microsoft.com/office/drawing/2014/main" id="{D5B4DB91-7E45-7C71-5E8F-A81D14B9E2EF}"/>
+              </a:ext>
+            </a:extLst>
+          </p:cNvPr>
+          <p:cNvSpPr>
+            <a:spLocks noGrp="1"/>
+          </p:cNvSpPr>
+          <p:nvPr>
+            <p:ph type="title"/>
+          </p:nvPr>
+        </p:nvSpPr>
+        <p:spPr>
+          <a:xfrm>
+            <a:off x="687062" y="278859"/>
+            <a:ext cx="8596668" cy="1320800"/>
+          </a:xfrm>
+        </p:spPr>
+        <p:txBody>
+          <a:bodyPr/>
+          <a:lstStyle/>
+          <a:p>
+            <a:r>
+              <a:rPr lang="en-US" dirty="0"/>
+              <a:t>3D model</a:t>
+            </a:r>
+            <a:endParaRPr lang="hu-HU" dirty="0"/>
+          </a:p>
+        </p:txBody>
+      </p:sp>
+      <p:pic>
+        <p:nvPicPr>
+          <p:cNvPr id="5" name="Picture 4" descr="A picture containing text, electronics&#10;&#10;Description automatically generated">
+            <a:extLst>
+              <a:ext uri="{FF2B5EF4-FFF2-40B4-BE49-F238E27FC236}">
+                <a16:creationId xmlns:a16="http://schemas.microsoft.com/office/drawing/2014/main" id="{55ADAA38-48B4-5AC1-EC8A-2729AA430E03}"/>
+              </a:ext>
+            </a:extLst>
+          </p:cNvPr>
+          <p:cNvPicPr>
+            <a:picLocks noChangeAspect="1"/>
+          </p:cNvPicPr>
+          <p:nvPr/>
+        </p:nvPicPr>
+        <p:blipFill rotWithShape="1">
+          <a:blip r:embed="rId2">
+            <a:extLst>
+              <a:ext uri="{28A0092B-C50C-407E-A947-70E740481C1C}">
+                <a14:useLocalDpi xmlns:a14="http://schemas.microsoft.com/office/drawing/2010/main" val="0"/>
+              </a:ext>
+            </a:extLst>
+          </a:blip>
+          <a:srcRect l="23854" t="684" r="24883"/>
+          <a:stretch/>
+        </p:blipFill>
+        <p:spPr>
+          <a:xfrm>
+            <a:off x="474634" y="1313234"/>
+            <a:ext cx="4867271" cy="4526280"/>
+          </a:xfrm>
+          <a:prstGeom prst="rect">
+            <a:avLst/>
+          </a:prstGeom>
+        </p:spPr>
+      </p:pic>
+      <p:pic>
+        <p:nvPicPr>
+          <p:cNvPr id="7" name="Picture 6" descr="A satellite in the sky&#10;&#10;Description automatically generated with low confidence">
+            <a:extLst>
+              <a:ext uri="{FF2B5EF4-FFF2-40B4-BE49-F238E27FC236}">
+                <a16:creationId xmlns:a16="http://schemas.microsoft.com/office/drawing/2014/main" id="{37AB61B6-1F16-F620-347B-809AD9BA5990}"/>
+              </a:ext>
+            </a:extLst>
+          </p:cNvPr>
+          <p:cNvPicPr>
+            <a:picLocks noChangeAspect="1"/>
+          </p:cNvPicPr>
+          <p:nvPr/>
+        </p:nvPicPr>
+        <p:blipFill rotWithShape="1">
+          <a:blip r:embed="rId3">
+            <a:extLst>
+              <a:ext uri="{28A0092B-C50C-407E-A947-70E740481C1C}">
+                <a14:useLocalDpi xmlns:a14="http://schemas.microsoft.com/office/drawing/2010/main" val="0"/>
+              </a:ext>
+            </a:extLst>
+          </a:blip>
+          <a:srcRect l="31407" t="2709" r="28670" b="11685"/>
+          <a:stretch/>
+        </p:blipFill>
+        <p:spPr>
+          <a:xfrm>
+            <a:off x="5920702" y="628247"/>
+            <a:ext cx="5728569" cy="5896254"/>
+          </a:xfrm>
+          <a:prstGeom prst="rect">
+            <a:avLst/>
+          </a:prstGeom>
+        </p:spPr>
+      </p:pic>
+    </p:spTree>
+    <p:extLst>
+      <p:ext uri="{BB962C8B-B14F-4D97-AF65-F5344CB8AC3E}">
+        <p14:creationId xmlns:p14="http://schemas.microsoft.com/office/powerpoint/2010/main" val="2662416188"/>
+      </p:ext>
+    </p:extLst>
+  </p:cSld>
+  <p:clrMapOvr>
+    <a:masterClrMapping/>
+  </p:clrMapOvr>
+</p:sld>
+</file>
+
+<file path=ppt/slides/slide12.xml><?xml version="1.0" encoding="utf-8"?>
+<p:sld xmlns:a="http://schemas.openxmlformats.org/drawingml/2006/main" xmlns:r="http://schemas.openxmlformats.org/officeDocument/2006/relationships" xmlns:p="http://schemas.openxmlformats.org/presentationml/2006/main">
+  <p:cSld>
+    <p:spTree>
+      <p:nvGrpSpPr>
+        <p:cNvPr id="1" name=""/>
+        <p:cNvGrpSpPr/>
+        <p:nvPr/>
+      </p:nvGrpSpPr>
+      <p:grpSpPr>
+        <a:xfrm>
+          <a:off x="0" y="0"/>
+          <a:ext cx="0" cy="0"/>
+          <a:chOff x="0" y="0"/>
+          <a:chExt cx="0" cy="0"/>
+        </a:xfrm>
+      </p:grpSpPr>
+      <p:sp>
+        <p:nvSpPr>
+          <p:cNvPr id="2" name="Title 1">
+            <a:extLst>
+              <a:ext uri="{FF2B5EF4-FFF2-40B4-BE49-F238E27FC236}">
+                <a16:creationId xmlns:a16="http://schemas.microsoft.com/office/drawing/2014/main" id="{A0705D0A-A58D-CF75-85E6-2D39DE3A5E23}"/>
+              </a:ext>
+            </a:extLst>
+          </p:cNvPr>
+          <p:cNvSpPr>
+            <a:spLocks noGrp="1"/>
+          </p:cNvSpPr>
+          <p:nvPr>
+            <p:ph type="title"/>
+          </p:nvPr>
+        </p:nvSpPr>
+        <p:spPr>
+          <a:xfrm>
+            <a:off x="677334" y="609600"/>
+            <a:ext cx="4667839" cy="992957"/>
+          </a:xfrm>
+        </p:spPr>
+        <p:txBody>
+          <a:bodyPr>
+            <a:noAutofit/>
+          </a:bodyPr>
+          <a:lstStyle/>
+          <a:p>
+            <a:r>
+              <a:rPr lang="en-US" sz="4500" dirty="0"/>
+              <a:t>Easy to install</a:t>
+            </a:r>
+            <a:endParaRPr lang="hu-HU" sz="4500" dirty="0"/>
+          </a:p>
+        </p:txBody>
+      </p:sp>
+      <p:sp>
+        <p:nvSpPr>
+          <p:cNvPr id="4" name="Title 1">
+            <a:extLst>
+              <a:ext uri="{FF2B5EF4-FFF2-40B4-BE49-F238E27FC236}">
+                <a16:creationId xmlns:a16="http://schemas.microsoft.com/office/drawing/2014/main" id="{1259AA44-F20C-A378-6639-3AB286B65A85}"/>
+              </a:ext>
+            </a:extLst>
+          </p:cNvPr>
+          <p:cNvSpPr txBox="1">
+            <a:spLocks/>
+          </p:cNvSpPr>
+          <p:nvPr/>
+        </p:nvSpPr>
+        <p:spPr>
+          <a:xfrm>
+            <a:off x="5345173" y="1469010"/>
+            <a:ext cx="3602435" cy="992957"/>
+          </a:xfrm>
+          <a:prstGeom prst="rect">
+            <a:avLst/>
+          </a:prstGeom>
+        </p:spPr>
+        <p:txBody>
+          <a:bodyPr vert="horz" lIns="91440" tIns="45720" rIns="91440" bIns="45720" rtlCol="0" anchor="t">
+            <a:normAutofit/>
+          </a:bodyPr>
+          <a:lstStyle>
+            <a:lvl1pPr algn="l" defTabSz="457200" rtl="0" eaLnBrk="1" latinLnBrk="0" hangingPunct="1">
+              <a:spcBef>
+                <a:spcPct val="0"/>
+              </a:spcBef>
+              <a:buNone/>
+              <a:defRPr sz="3600" kern="1200">
+                <a:solidFill>
+                  <a:schemeClr val="accent1"/>
+                </a:solidFill>
+                <a:latin typeface="+mj-lt"/>
+                <a:ea typeface="+mj-ea"/>
+                <a:cs typeface="+mj-cs"/>
+              </a:defRPr>
+            </a:lvl1pPr>
+            <a:lvl2pPr eaLnBrk="1" hangingPunct="1">
+              <a:defRPr>
+                <a:solidFill>
+                  <a:schemeClr val="tx2"/>
+                </a:solidFill>
+              </a:defRPr>
+            </a:lvl2pPr>
+            <a:lvl3pPr eaLnBrk="1" hangingPunct="1">
+              <a:defRPr>
+                <a:solidFill>
+                  <a:schemeClr val="tx2"/>
+                </a:solidFill>
+              </a:defRPr>
+            </a:lvl3pPr>
+            <a:lvl4pPr eaLnBrk="1" hangingPunct="1">
+              <a:defRPr>
+                <a:solidFill>
+                  <a:schemeClr val="tx2"/>
+                </a:solidFill>
+              </a:defRPr>
+            </a:lvl4pPr>
+            <a:lvl5pPr eaLnBrk="1" hangingPunct="1">
+              <a:defRPr>
+                <a:solidFill>
+                  <a:schemeClr val="tx2"/>
+                </a:solidFill>
+              </a:defRPr>
+            </a:lvl5pPr>
+            <a:lvl6pPr eaLnBrk="1" hangingPunct="1">
+              <a:defRPr>
+                <a:solidFill>
+                  <a:schemeClr val="tx2"/>
+                </a:solidFill>
+              </a:defRPr>
+            </a:lvl6pPr>
+            <a:lvl7pPr eaLnBrk="1" hangingPunct="1">
+              <a:defRPr>
+                <a:solidFill>
+                  <a:schemeClr val="tx2"/>
+                </a:solidFill>
+              </a:defRPr>
+            </a:lvl7pPr>
+            <a:lvl8pPr eaLnBrk="1" hangingPunct="1">
+              <a:defRPr>
+                <a:solidFill>
+                  <a:schemeClr val="tx2"/>
+                </a:solidFill>
+              </a:defRPr>
+            </a:lvl8pPr>
+            <a:lvl9pPr eaLnBrk="1" hangingPunct="1">
+              <a:defRPr>
+                <a:solidFill>
+                  <a:schemeClr val="tx2"/>
+                </a:solidFill>
+              </a:defRPr>
+            </a:lvl9pPr>
+          </a:lstStyle>
+          <a:p>
+            <a:r>
+              <a:rPr lang="en-US" sz="4500" dirty="0"/>
+              <a:t>Scalable</a:t>
+            </a:r>
+            <a:endParaRPr lang="hu-HU" sz="4500" dirty="0"/>
+          </a:p>
+        </p:txBody>
+      </p:sp>
+      <p:sp>
+        <p:nvSpPr>
+          <p:cNvPr id="5" name="Title 1">
+            <a:extLst>
+              <a:ext uri="{FF2B5EF4-FFF2-40B4-BE49-F238E27FC236}">
+                <a16:creationId xmlns:a16="http://schemas.microsoft.com/office/drawing/2014/main" id="{9D94D656-A5D5-5C1F-190F-41D0BFD06445}"/>
+              </a:ext>
+            </a:extLst>
+          </p:cNvPr>
+          <p:cNvSpPr txBox="1">
+            <a:spLocks/>
+          </p:cNvSpPr>
+          <p:nvPr/>
+        </p:nvSpPr>
+        <p:spPr>
+          <a:xfrm>
+            <a:off x="982134" y="2932521"/>
+            <a:ext cx="4504266" cy="992957"/>
+          </a:xfrm>
+          <a:prstGeom prst="rect">
+            <a:avLst/>
+          </a:prstGeom>
+        </p:spPr>
+        <p:txBody>
+          <a:bodyPr vert="horz" lIns="91440" tIns="45720" rIns="91440" bIns="45720" rtlCol="0" anchor="t">
+            <a:noAutofit/>
+          </a:bodyPr>
+          <a:lstStyle>
+            <a:lvl1pPr algn="l" defTabSz="457200" rtl="0" eaLnBrk="1" latinLnBrk="0" hangingPunct="1">
+              <a:spcBef>
+                <a:spcPct val="0"/>
+              </a:spcBef>
+              <a:buNone/>
+              <a:defRPr sz="3600" kern="1200">
+                <a:solidFill>
+                  <a:schemeClr val="accent1"/>
+                </a:solidFill>
+                <a:latin typeface="+mj-lt"/>
+                <a:ea typeface="+mj-ea"/>
+                <a:cs typeface="+mj-cs"/>
+              </a:defRPr>
+            </a:lvl1pPr>
+            <a:lvl2pPr eaLnBrk="1" hangingPunct="1">
+              <a:defRPr>
+                <a:solidFill>
+                  <a:schemeClr val="tx2"/>
+                </a:solidFill>
+              </a:defRPr>
+            </a:lvl2pPr>
+            <a:lvl3pPr eaLnBrk="1" hangingPunct="1">
+              <a:defRPr>
+                <a:solidFill>
+                  <a:schemeClr val="tx2"/>
+                </a:solidFill>
+              </a:defRPr>
+            </a:lvl3pPr>
+            <a:lvl4pPr eaLnBrk="1" hangingPunct="1">
+              <a:defRPr>
+                <a:solidFill>
+                  <a:schemeClr val="tx2"/>
+                </a:solidFill>
+              </a:defRPr>
+            </a:lvl4pPr>
+            <a:lvl5pPr eaLnBrk="1" hangingPunct="1">
+              <a:defRPr>
+                <a:solidFill>
+                  <a:schemeClr val="tx2"/>
+                </a:solidFill>
+              </a:defRPr>
+            </a:lvl5pPr>
+            <a:lvl6pPr eaLnBrk="1" hangingPunct="1">
+              <a:defRPr>
+                <a:solidFill>
+                  <a:schemeClr val="tx2"/>
+                </a:solidFill>
+              </a:defRPr>
+            </a:lvl6pPr>
+            <a:lvl7pPr eaLnBrk="1" hangingPunct="1">
+              <a:defRPr>
+                <a:solidFill>
+                  <a:schemeClr val="tx2"/>
+                </a:solidFill>
+              </a:defRPr>
+            </a:lvl7pPr>
+            <a:lvl8pPr eaLnBrk="1" hangingPunct="1">
+              <a:defRPr>
+                <a:solidFill>
+                  <a:schemeClr val="tx2"/>
+                </a:solidFill>
+              </a:defRPr>
+            </a:lvl8pPr>
+            <a:lvl9pPr eaLnBrk="1" hangingPunct="1">
+              <a:defRPr>
+                <a:solidFill>
+                  <a:schemeClr val="tx2"/>
+                </a:solidFill>
+              </a:defRPr>
+            </a:lvl9pPr>
+          </a:lstStyle>
+          <a:p>
+            <a:r>
+              <a:rPr lang="en-US" sz="4500" dirty="0"/>
+              <a:t>Multi-purpose</a:t>
+            </a:r>
+            <a:endParaRPr lang="hu-HU" sz="4500" dirty="0"/>
+          </a:p>
+        </p:txBody>
+      </p:sp>
+      <p:sp>
+        <p:nvSpPr>
+          <p:cNvPr id="6" name="Title 1">
+            <a:extLst>
+              <a:ext uri="{FF2B5EF4-FFF2-40B4-BE49-F238E27FC236}">
+                <a16:creationId xmlns:a16="http://schemas.microsoft.com/office/drawing/2014/main" id="{6EA15E3E-1285-F588-5982-79690C839334}"/>
+              </a:ext>
+            </a:extLst>
+          </p:cNvPr>
+          <p:cNvSpPr txBox="1">
+            <a:spLocks/>
+          </p:cNvSpPr>
+          <p:nvPr/>
+        </p:nvSpPr>
+        <p:spPr>
+          <a:xfrm>
+            <a:off x="4254310" y="4727580"/>
+            <a:ext cx="5274701" cy="2210587"/>
+          </a:xfrm>
+          <a:prstGeom prst="rect">
+            <a:avLst/>
+          </a:prstGeom>
+        </p:spPr>
+        <p:txBody>
+          <a:bodyPr vert="horz" lIns="91440" tIns="45720" rIns="91440" bIns="45720" rtlCol="0" anchor="t">
+            <a:noAutofit/>
+          </a:bodyPr>
+          <a:lstStyle>
+            <a:lvl1pPr algn="l" defTabSz="457200" rtl="0" eaLnBrk="1" latinLnBrk="0" hangingPunct="1">
+              <a:spcBef>
+                <a:spcPct val="0"/>
+              </a:spcBef>
+              <a:buNone/>
+              <a:defRPr sz="3600" kern="1200">
+                <a:solidFill>
+                  <a:schemeClr val="accent1"/>
+                </a:solidFill>
+                <a:latin typeface="+mj-lt"/>
+                <a:ea typeface="+mj-ea"/>
+                <a:cs typeface="+mj-cs"/>
+              </a:defRPr>
+            </a:lvl1pPr>
+            <a:lvl2pPr eaLnBrk="1" hangingPunct="1">
+              <a:defRPr>
+                <a:solidFill>
+                  <a:schemeClr val="tx2"/>
+                </a:solidFill>
+              </a:defRPr>
+            </a:lvl2pPr>
+            <a:lvl3pPr eaLnBrk="1" hangingPunct="1">
+              <a:defRPr>
+                <a:solidFill>
+                  <a:schemeClr val="tx2"/>
+                </a:solidFill>
+              </a:defRPr>
+            </a:lvl3pPr>
+            <a:lvl4pPr eaLnBrk="1" hangingPunct="1">
+              <a:defRPr>
+                <a:solidFill>
+                  <a:schemeClr val="tx2"/>
+                </a:solidFill>
+              </a:defRPr>
+            </a:lvl4pPr>
+            <a:lvl5pPr eaLnBrk="1" hangingPunct="1">
+              <a:defRPr>
+                <a:solidFill>
+                  <a:schemeClr val="tx2"/>
+                </a:solidFill>
+              </a:defRPr>
+            </a:lvl5pPr>
+            <a:lvl6pPr eaLnBrk="1" hangingPunct="1">
+              <a:defRPr>
+                <a:solidFill>
+                  <a:schemeClr val="tx2"/>
+                </a:solidFill>
+              </a:defRPr>
+            </a:lvl6pPr>
+            <a:lvl7pPr eaLnBrk="1" hangingPunct="1">
+              <a:defRPr>
+                <a:solidFill>
+                  <a:schemeClr val="tx2"/>
+                </a:solidFill>
+              </a:defRPr>
+            </a:lvl7pPr>
+            <a:lvl8pPr eaLnBrk="1" hangingPunct="1">
+              <a:defRPr>
+                <a:solidFill>
+                  <a:schemeClr val="tx2"/>
+                </a:solidFill>
+              </a:defRPr>
+            </a:lvl8pPr>
+            <a:lvl9pPr eaLnBrk="1" hangingPunct="1">
+              <a:defRPr>
+                <a:solidFill>
+                  <a:schemeClr val="tx2"/>
+                </a:solidFill>
+              </a:defRPr>
+            </a:lvl9pPr>
+          </a:lstStyle>
+          <a:p>
+            <a:r>
+              <a:rPr lang="en-US" sz="4500" dirty="0"/>
+              <a:t>Low consumption</a:t>
+            </a:r>
+            <a:endParaRPr lang="hu-HU" sz="4500" dirty="0"/>
+          </a:p>
+        </p:txBody>
+      </p:sp>
+    </p:spTree>
+    <p:extLst>
+      <p:ext uri="{BB962C8B-B14F-4D97-AF65-F5344CB8AC3E}">
+        <p14:creationId xmlns:p14="http://schemas.microsoft.com/office/powerpoint/2010/main" val="2200446706"/>
+      </p:ext>
+    </p:extLst>
+  </p:cSld>
+  <p:clrMapOvr>
+    <a:masterClrMapping/>
+  </p:clrMapOvr>
+</p:sld>
+</file>
+
 <file path=ppt/slides/slide2.xml><?xml version="1.0" encoding="utf-8"?>
 <p:sld xmlns:a="http://schemas.openxmlformats.org/drawingml/2006/main" xmlns:r="http://schemas.openxmlformats.org/officeDocument/2006/relationships" xmlns:p="http://schemas.openxmlformats.org/presentationml/2006/main">
   <p:cSld>
@@ -6424,8 +7075,8 @@
         </p:nvSpPr>
         <p:spPr>
           <a:xfrm>
-            <a:off x="677334" y="1791093"/>
-            <a:ext cx="8596668" cy="4250269"/>
+            <a:off x="356321" y="1393812"/>
+            <a:ext cx="8596668" cy="4854588"/>
           </a:xfrm>
         </p:spPr>
         <p:txBody>
@@ -6498,6 +7149,13 @@
             <a:r>
               <a:rPr lang="en-US" dirty="0"/>
               <a:t>)</a:t>
+            </a:r>
+          </a:p>
+          <a:p>
+            <a:pPr lvl="1"/>
+            <a:r>
+              <a:rPr lang="en-US" dirty="0"/>
+              <a:t>Example: when it is raining outside (or when it is very cold compared to the desired temp), de device will be much more reluctant to open the window</a:t>
             </a:r>
           </a:p>
         </p:txBody>
@@ -8118,9 +8776,16 @@
             <p:ph idx="1"/>
           </p:nvPr>
         </p:nvSpPr>
-        <p:spPr/>
+        <p:spPr>
+          <a:xfrm>
+            <a:off x="677334" y="1322961"/>
+            <a:ext cx="8596668" cy="5282119"/>
+          </a:xfrm>
+        </p:spPr>
         <p:txBody>
-          <a:bodyPr/>
+          <a:bodyPr>
+            <a:normAutofit/>
+          </a:bodyPr>
           <a:lstStyle/>
           <a:p>
             <a:r>
@@ -8136,6 +8801,13 @@
             </a:r>
           </a:p>
           <a:p>
+            <a:pPr lvl="2"/>
+            <a:r>
+              <a:rPr lang="en-US" dirty="0"/>
+              <a:t>VOC sensor (SGP40)</a:t>
+            </a:r>
+          </a:p>
+          <a:p>
             <a:pPr lvl="1"/>
             <a:r>
               <a:rPr lang="en-US" dirty="0"/>
@@ -8154,9 +8826,39 @@
             </a:r>
           </a:p>
           <a:p>
+            <a:pPr lvl="1"/>
+            <a:r>
+              <a:rPr lang="en-US" dirty="0"/>
+              <a:t>This is more secure and uses less energy than having </a:t>
+            </a:r>
+            <a:r>
+              <a:rPr lang="en-US" dirty="0" err="1"/>
+              <a:t>WiFi</a:t>
+            </a:r>
+            <a:r>
+              <a:rPr lang="en-US" dirty="0"/>
+              <a:t> on every board</a:t>
+            </a:r>
+          </a:p>
+          <a:p>
             <a:r>
               <a:rPr lang="en-US" dirty="0"/>
               <a:t>Scalable: you can use any number of devices</a:t>
+            </a:r>
+          </a:p>
+          <a:p>
+            <a:pPr lvl="1"/>
+            <a:r>
+              <a:rPr lang="en-US" dirty="0"/>
+              <a:t>One Controller will be the gateway to the outside world through </a:t>
+            </a:r>
+            <a:r>
+              <a:rPr lang="en-US" dirty="0" err="1"/>
+              <a:t>WiFi</a:t>
+            </a:r>
+            <a:r>
+              <a:rPr lang="en-US" dirty="0"/>
+              <a:t>, everything else is internal communication in the network</a:t>
             </a:r>
           </a:p>
           <a:p>
@@ -9864,7 +10566,7 @@
             <a:pPr lvl="1"/>
             <a:r>
               <a:rPr lang="en-US" dirty="0"/>
-              <a:t>So the system pays back its price in 2 years</a:t>
+              <a:t>So the system pays back its price in about 2 years</a:t>
             </a:r>
           </a:p>
           <a:p>
@@ -9893,396 +10595,6 @@
 </file>
 
 <file path=ppt/slides/slide8.xml><?xml version="1.0" encoding="utf-8"?>
-<p:sld xmlns:a="http://schemas.openxmlformats.org/drawingml/2006/main" xmlns:r="http://schemas.openxmlformats.org/officeDocument/2006/relationships" xmlns:p="http://schemas.openxmlformats.org/presentationml/2006/main">
-  <p:cSld>
-    <p:spTree>
-      <p:nvGrpSpPr>
-        <p:cNvPr id="1" name=""/>
-        <p:cNvGrpSpPr/>
-        <p:nvPr/>
-      </p:nvGrpSpPr>
-      <p:grpSpPr>
-        <a:xfrm>
-          <a:off x="0" y="0"/>
-          <a:ext cx="0" cy="0"/>
-          <a:chOff x="0" y="0"/>
-          <a:chExt cx="0" cy="0"/>
-        </a:xfrm>
-      </p:grpSpPr>
-      <p:sp>
-        <p:nvSpPr>
-          <p:cNvPr id="2" name="Title 1">
-            <a:extLst>
-              <a:ext uri="{FF2B5EF4-FFF2-40B4-BE49-F238E27FC236}">
-                <a16:creationId xmlns:a16="http://schemas.microsoft.com/office/drawing/2014/main" id="{A0705D0A-A58D-CF75-85E6-2D39DE3A5E23}"/>
-              </a:ext>
-            </a:extLst>
-          </p:cNvPr>
-          <p:cNvSpPr>
-            <a:spLocks noGrp="1"/>
-          </p:cNvSpPr>
-          <p:nvPr>
-            <p:ph type="title"/>
-          </p:nvPr>
-        </p:nvSpPr>
-        <p:spPr>
-          <a:xfrm>
-            <a:off x="677334" y="609600"/>
-            <a:ext cx="4667839" cy="992957"/>
-          </a:xfrm>
-        </p:spPr>
-        <p:txBody>
-          <a:bodyPr>
-            <a:noAutofit/>
-          </a:bodyPr>
-          <a:lstStyle/>
-          <a:p>
-            <a:r>
-              <a:rPr lang="en-US" sz="4500" dirty="0"/>
-              <a:t>Easy to install</a:t>
-            </a:r>
-            <a:endParaRPr lang="hu-HU" sz="4500" dirty="0"/>
-          </a:p>
-        </p:txBody>
-      </p:sp>
-      <p:sp>
-        <p:nvSpPr>
-          <p:cNvPr id="4" name="Title 1">
-            <a:extLst>
-              <a:ext uri="{FF2B5EF4-FFF2-40B4-BE49-F238E27FC236}">
-                <a16:creationId xmlns:a16="http://schemas.microsoft.com/office/drawing/2014/main" id="{1259AA44-F20C-A378-6639-3AB286B65A85}"/>
-              </a:ext>
-            </a:extLst>
-          </p:cNvPr>
-          <p:cNvSpPr txBox="1">
-            <a:spLocks/>
-          </p:cNvSpPr>
-          <p:nvPr/>
-        </p:nvSpPr>
-        <p:spPr>
-          <a:xfrm>
-            <a:off x="5345173" y="1469010"/>
-            <a:ext cx="3602435" cy="992957"/>
-          </a:xfrm>
-          <a:prstGeom prst="rect">
-            <a:avLst/>
-          </a:prstGeom>
-        </p:spPr>
-        <p:txBody>
-          <a:bodyPr vert="horz" lIns="91440" tIns="45720" rIns="91440" bIns="45720" rtlCol="0" anchor="t">
-            <a:normAutofit/>
-          </a:bodyPr>
-          <a:lstStyle>
-            <a:lvl1pPr algn="l" defTabSz="457200" rtl="0" eaLnBrk="1" latinLnBrk="0" hangingPunct="1">
-              <a:spcBef>
-                <a:spcPct val="0"/>
-              </a:spcBef>
-              <a:buNone/>
-              <a:defRPr sz="3600" kern="1200">
-                <a:solidFill>
-                  <a:schemeClr val="accent1"/>
-                </a:solidFill>
-                <a:latin typeface="+mj-lt"/>
-                <a:ea typeface="+mj-ea"/>
-                <a:cs typeface="+mj-cs"/>
-              </a:defRPr>
-            </a:lvl1pPr>
-            <a:lvl2pPr eaLnBrk="1" hangingPunct="1">
-              <a:defRPr>
-                <a:solidFill>
-                  <a:schemeClr val="tx2"/>
-                </a:solidFill>
-              </a:defRPr>
-            </a:lvl2pPr>
-            <a:lvl3pPr eaLnBrk="1" hangingPunct="1">
-              <a:defRPr>
-                <a:solidFill>
-                  <a:schemeClr val="tx2"/>
-                </a:solidFill>
-              </a:defRPr>
-            </a:lvl3pPr>
-            <a:lvl4pPr eaLnBrk="1" hangingPunct="1">
-              <a:defRPr>
-                <a:solidFill>
-                  <a:schemeClr val="tx2"/>
-                </a:solidFill>
-              </a:defRPr>
-            </a:lvl4pPr>
-            <a:lvl5pPr eaLnBrk="1" hangingPunct="1">
-              <a:defRPr>
-                <a:solidFill>
-                  <a:schemeClr val="tx2"/>
-                </a:solidFill>
-              </a:defRPr>
-            </a:lvl5pPr>
-            <a:lvl6pPr eaLnBrk="1" hangingPunct="1">
-              <a:defRPr>
-                <a:solidFill>
-                  <a:schemeClr val="tx2"/>
-                </a:solidFill>
-              </a:defRPr>
-            </a:lvl6pPr>
-            <a:lvl7pPr eaLnBrk="1" hangingPunct="1">
-              <a:defRPr>
-                <a:solidFill>
-                  <a:schemeClr val="tx2"/>
-                </a:solidFill>
-              </a:defRPr>
-            </a:lvl7pPr>
-            <a:lvl8pPr eaLnBrk="1" hangingPunct="1">
-              <a:defRPr>
-                <a:solidFill>
-                  <a:schemeClr val="tx2"/>
-                </a:solidFill>
-              </a:defRPr>
-            </a:lvl8pPr>
-            <a:lvl9pPr eaLnBrk="1" hangingPunct="1">
-              <a:defRPr>
-                <a:solidFill>
-                  <a:schemeClr val="tx2"/>
-                </a:solidFill>
-              </a:defRPr>
-            </a:lvl9pPr>
-          </a:lstStyle>
-          <a:p>
-            <a:r>
-              <a:rPr lang="en-US" sz="4500" dirty="0"/>
-              <a:t>Scalable</a:t>
-            </a:r>
-            <a:endParaRPr lang="hu-HU" sz="4500" dirty="0"/>
-          </a:p>
-        </p:txBody>
-      </p:sp>
-      <p:sp>
-        <p:nvSpPr>
-          <p:cNvPr id="5" name="Title 1">
-            <a:extLst>
-              <a:ext uri="{FF2B5EF4-FFF2-40B4-BE49-F238E27FC236}">
-                <a16:creationId xmlns:a16="http://schemas.microsoft.com/office/drawing/2014/main" id="{9D94D656-A5D5-5C1F-190F-41D0BFD06445}"/>
-              </a:ext>
-            </a:extLst>
-          </p:cNvPr>
-          <p:cNvSpPr txBox="1">
-            <a:spLocks/>
-          </p:cNvSpPr>
-          <p:nvPr/>
-        </p:nvSpPr>
-        <p:spPr>
-          <a:xfrm>
-            <a:off x="982134" y="2932521"/>
-            <a:ext cx="4504266" cy="992957"/>
-          </a:xfrm>
-          <a:prstGeom prst="rect">
-            <a:avLst/>
-          </a:prstGeom>
-        </p:spPr>
-        <p:txBody>
-          <a:bodyPr vert="horz" lIns="91440" tIns="45720" rIns="91440" bIns="45720" rtlCol="0" anchor="t">
-            <a:noAutofit/>
-          </a:bodyPr>
-          <a:lstStyle>
-            <a:lvl1pPr algn="l" defTabSz="457200" rtl="0" eaLnBrk="1" latinLnBrk="0" hangingPunct="1">
-              <a:spcBef>
-                <a:spcPct val="0"/>
-              </a:spcBef>
-              <a:buNone/>
-              <a:defRPr sz="3600" kern="1200">
-                <a:solidFill>
-                  <a:schemeClr val="accent1"/>
-                </a:solidFill>
-                <a:latin typeface="+mj-lt"/>
-                <a:ea typeface="+mj-ea"/>
-                <a:cs typeface="+mj-cs"/>
-              </a:defRPr>
-            </a:lvl1pPr>
-            <a:lvl2pPr eaLnBrk="1" hangingPunct="1">
-              <a:defRPr>
-                <a:solidFill>
-                  <a:schemeClr val="tx2"/>
-                </a:solidFill>
-              </a:defRPr>
-            </a:lvl2pPr>
-            <a:lvl3pPr eaLnBrk="1" hangingPunct="1">
-              <a:defRPr>
-                <a:solidFill>
-                  <a:schemeClr val="tx2"/>
-                </a:solidFill>
-              </a:defRPr>
-            </a:lvl3pPr>
-            <a:lvl4pPr eaLnBrk="1" hangingPunct="1">
-              <a:defRPr>
-                <a:solidFill>
-                  <a:schemeClr val="tx2"/>
-                </a:solidFill>
-              </a:defRPr>
-            </a:lvl4pPr>
-            <a:lvl5pPr eaLnBrk="1" hangingPunct="1">
-              <a:defRPr>
-                <a:solidFill>
-                  <a:schemeClr val="tx2"/>
-                </a:solidFill>
-              </a:defRPr>
-            </a:lvl5pPr>
-            <a:lvl6pPr eaLnBrk="1" hangingPunct="1">
-              <a:defRPr>
-                <a:solidFill>
-                  <a:schemeClr val="tx2"/>
-                </a:solidFill>
-              </a:defRPr>
-            </a:lvl6pPr>
-            <a:lvl7pPr eaLnBrk="1" hangingPunct="1">
-              <a:defRPr>
-                <a:solidFill>
-                  <a:schemeClr val="tx2"/>
-                </a:solidFill>
-              </a:defRPr>
-            </a:lvl7pPr>
-            <a:lvl8pPr eaLnBrk="1" hangingPunct="1">
-              <a:defRPr>
-                <a:solidFill>
-                  <a:schemeClr val="tx2"/>
-                </a:solidFill>
-              </a:defRPr>
-            </a:lvl8pPr>
-            <a:lvl9pPr eaLnBrk="1" hangingPunct="1">
-              <a:defRPr>
-                <a:solidFill>
-                  <a:schemeClr val="tx2"/>
-                </a:solidFill>
-              </a:defRPr>
-            </a:lvl9pPr>
-          </a:lstStyle>
-          <a:p>
-            <a:r>
-              <a:rPr lang="en-US" sz="4500" dirty="0"/>
-              <a:t>Multi-purpose</a:t>
-            </a:r>
-            <a:endParaRPr lang="hu-HU" sz="4500" dirty="0"/>
-          </a:p>
-        </p:txBody>
-      </p:sp>
-      <p:sp>
-        <p:nvSpPr>
-          <p:cNvPr id="6" name="Title 1">
-            <a:extLst>
-              <a:ext uri="{FF2B5EF4-FFF2-40B4-BE49-F238E27FC236}">
-                <a16:creationId xmlns:a16="http://schemas.microsoft.com/office/drawing/2014/main" id="{6EA15E3E-1285-F588-5982-79690C839334}"/>
-              </a:ext>
-            </a:extLst>
-          </p:cNvPr>
-          <p:cNvSpPr txBox="1">
-            <a:spLocks/>
-          </p:cNvSpPr>
-          <p:nvPr/>
-        </p:nvSpPr>
-        <p:spPr>
-          <a:xfrm>
-            <a:off x="4254310" y="4727580"/>
-            <a:ext cx="5274701" cy="2210587"/>
-          </a:xfrm>
-          <a:prstGeom prst="rect">
-            <a:avLst/>
-          </a:prstGeom>
-        </p:spPr>
-        <p:txBody>
-          <a:bodyPr vert="horz" lIns="91440" tIns="45720" rIns="91440" bIns="45720" rtlCol="0" anchor="t">
-            <a:noAutofit/>
-          </a:bodyPr>
-          <a:lstStyle>
-            <a:lvl1pPr algn="l" defTabSz="457200" rtl="0" eaLnBrk="1" latinLnBrk="0" hangingPunct="1">
-              <a:spcBef>
-                <a:spcPct val="0"/>
-              </a:spcBef>
-              <a:buNone/>
-              <a:defRPr sz="3600" kern="1200">
-                <a:solidFill>
-                  <a:schemeClr val="accent1"/>
-                </a:solidFill>
-                <a:latin typeface="+mj-lt"/>
-                <a:ea typeface="+mj-ea"/>
-                <a:cs typeface="+mj-cs"/>
-              </a:defRPr>
-            </a:lvl1pPr>
-            <a:lvl2pPr eaLnBrk="1" hangingPunct="1">
-              <a:defRPr>
-                <a:solidFill>
-                  <a:schemeClr val="tx2"/>
-                </a:solidFill>
-              </a:defRPr>
-            </a:lvl2pPr>
-            <a:lvl3pPr eaLnBrk="1" hangingPunct="1">
-              <a:defRPr>
-                <a:solidFill>
-                  <a:schemeClr val="tx2"/>
-                </a:solidFill>
-              </a:defRPr>
-            </a:lvl3pPr>
-            <a:lvl4pPr eaLnBrk="1" hangingPunct="1">
-              <a:defRPr>
-                <a:solidFill>
-                  <a:schemeClr val="tx2"/>
-                </a:solidFill>
-              </a:defRPr>
-            </a:lvl4pPr>
-            <a:lvl5pPr eaLnBrk="1" hangingPunct="1">
-              <a:defRPr>
-                <a:solidFill>
-                  <a:schemeClr val="tx2"/>
-                </a:solidFill>
-              </a:defRPr>
-            </a:lvl5pPr>
-            <a:lvl6pPr eaLnBrk="1" hangingPunct="1">
-              <a:defRPr>
-                <a:solidFill>
-                  <a:schemeClr val="tx2"/>
-                </a:solidFill>
-              </a:defRPr>
-            </a:lvl6pPr>
-            <a:lvl7pPr eaLnBrk="1" hangingPunct="1">
-              <a:defRPr>
-                <a:solidFill>
-                  <a:schemeClr val="tx2"/>
-                </a:solidFill>
-              </a:defRPr>
-            </a:lvl7pPr>
-            <a:lvl8pPr eaLnBrk="1" hangingPunct="1">
-              <a:defRPr>
-                <a:solidFill>
-                  <a:schemeClr val="tx2"/>
-                </a:solidFill>
-              </a:defRPr>
-            </a:lvl8pPr>
-            <a:lvl9pPr eaLnBrk="1" hangingPunct="1">
-              <a:defRPr>
-                <a:solidFill>
-                  <a:schemeClr val="tx2"/>
-                </a:solidFill>
-              </a:defRPr>
-            </a:lvl9pPr>
-          </a:lstStyle>
-          <a:p>
-            <a:r>
-              <a:rPr lang="en-US" sz="4500" dirty="0"/>
-              <a:t>Low consumption</a:t>
-            </a:r>
-            <a:endParaRPr lang="hu-HU" sz="4500" dirty="0"/>
-          </a:p>
-        </p:txBody>
-      </p:sp>
-    </p:spTree>
-    <p:extLst>
-      <p:ext uri="{BB962C8B-B14F-4D97-AF65-F5344CB8AC3E}">
-        <p14:creationId xmlns:p14="http://schemas.microsoft.com/office/powerpoint/2010/main" val="2200446706"/>
-      </p:ext>
-    </p:extLst>
-  </p:cSld>
-  <p:clrMapOvr>
-    <a:masterClrMapping/>
-  </p:clrMapOvr>
-</p:sld>
-</file>
-
-<file path=ppt/slides/slide9.xml><?xml version="1.0" encoding="utf-8"?>
 <p:sld xmlns:a="http://schemas.openxmlformats.org/drawingml/2006/main" xmlns:r="http://schemas.openxmlformats.org/officeDocument/2006/relationships" xmlns:p="http://schemas.openxmlformats.org/presentationml/2006/main">
   <p:cSld>
     <p:bg>
@@ -10309,10 +10621,10 @@
       </p:grpSpPr>
       <p:grpSp>
         <p:nvGrpSpPr>
-          <p:cNvPr id="12" name="Group 11">
+          <p:cNvPr id="45" name="Group 9">
             <a:extLst>
               <a:ext uri="{FF2B5EF4-FFF2-40B4-BE49-F238E27FC236}">
-                <a16:creationId xmlns:a16="http://schemas.microsoft.com/office/drawing/2014/main" id="{7664F850-BA8B-47AE-B11A-225CAB8969F1}"/>
+                <a16:creationId xmlns:a16="http://schemas.microsoft.com/office/drawing/2014/main" id="{609316A9-990D-4EC3-A671-70EE5C1493A4}"/>
               </a:ext>
               <a:ext uri="{C183D7F6-B498-43B3-948B-1728B52AA6E4}">
                 <adec:decorative xmlns:adec="http://schemas.microsoft.com/office/drawing/2017/decorative" val="1"/>
@@ -10340,10 +10652,10 @@
         </p:grpSpPr>
         <p:cxnSp>
           <p:nvCxnSpPr>
-            <p:cNvPr id="13" name="Straight Connector 12">
+            <p:cNvPr id="11" name="Straight Connector 10">
               <a:extLst>
                 <a:ext uri="{FF2B5EF4-FFF2-40B4-BE49-F238E27FC236}">
-                  <a16:creationId xmlns:a16="http://schemas.microsoft.com/office/drawing/2014/main" id="{634FC909-7343-4DEC-920F-098F56B476F0}"/>
+                  <a16:creationId xmlns:a16="http://schemas.microsoft.com/office/drawing/2014/main" id="{9B0C6109-9159-49CA-AD7A-F9035539DB7F}"/>
                 </a:ext>
                 <a:ext uri="{C183D7F6-B498-43B3-948B-1728B52AA6E4}">
                   <adec:decorative xmlns:adec="http://schemas.microsoft.com/office/drawing/2017/decorative" val="1"/>
@@ -10392,10 +10704,10 @@
         </p:cxnSp>
         <p:cxnSp>
           <p:nvCxnSpPr>
-            <p:cNvPr id="14" name="Straight Connector 13">
+            <p:cNvPr id="12" name="Straight Connector 11">
               <a:extLst>
                 <a:ext uri="{FF2B5EF4-FFF2-40B4-BE49-F238E27FC236}">
-                  <a16:creationId xmlns:a16="http://schemas.microsoft.com/office/drawing/2014/main" id="{24F22DB2-7E27-4CF7-8B17-254ECB9AE771}"/>
+                  <a16:creationId xmlns:a16="http://schemas.microsoft.com/office/drawing/2014/main" id="{686F14F5-308C-4EB6-87AB-05DE9501B1AA}"/>
                 </a:ext>
                 <a:ext uri="{C183D7F6-B498-43B3-948B-1728B52AA6E4}">
                   <adec:decorative xmlns:adec="http://schemas.microsoft.com/office/drawing/2017/decorative" val="1"/>
@@ -10444,10 +10756,10 @@
         </p:cxnSp>
         <p:sp>
           <p:nvSpPr>
-            <p:cNvPr id="15" name="Rectangle 23">
+            <p:cNvPr id="13" name="Rectangle 23">
               <a:extLst>
                 <a:ext uri="{FF2B5EF4-FFF2-40B4-BE49-F238E27FC236}">
-                  <a16:creationId xmlns:a16="http://schemas.microsoft.com/office/drawing/2014/main" id="{C6E593B3-91A3-4687-8B8D-FE37A3714FD2}"/>
+                  <a16:creationId xmlns:a16="http://schemas.microsoft.com/office/drawing/2014/main" id="{BA032363-A188-47C5-9D59-9B788809DCD2}"/>
                 </a:ext>
                 <a:ext uri="{C183D7F6-B498-43B3-948B-1728B52AA6E4}">
                   <adec:decorative xmlns:adec="http://schemas.microsoft.com/office/drawing/2017/decorative" val="1"/>
@@ -10522,10 +10834,10 @@
         </p:sp>
         <p:sp>
           <p:nvSpPr>
-            <p:cNvPr id="16" name="Rectangle 25">
+            <p:cNvPr id="14" name="Rectangle 25">
               <a:extLst>
                 <a:ext uri="{FF2B5EF4-FFF2-40B4-BE49-F238E27FC236}">
-                  <a16:creationId xmlns:a16="http://schemas.microsoft.com/office/drawing/2014/main" id="{0C25B431-5C97-4B8D-B0A3-BFB8133C7173}"/>
+                  <a16:creationId xmlns:a16="http://schemas.microsoft.com/office/drawing/2014/main" id="{2C4077DF-6BB9-4069-AD28-6B1664EBB064}"/>
                 </a:ext>
                 <a:ext uri="{C183D7F6-B498-43B3-948B-1728B52AA6E4}">
                   <adec:decorative xmlns:adec="http://schemas.microsoft.com/office/drawing/2017/decorative" val="1"/>
@@ -10600,10 +10912,10 @@
         </p:sp>
         <p:sp>
           <p:nvSpPr>
-            <p:cNvPr id="17" name="Isosceles Triangle 16">
+            <p:cNvPr id="15" name="Isosceles Triangle 14">
               <a:extLst>
                 <a:ext uri="{FF2B5EF4-FFF2-40B4-BE49-F238E27FC236}">
-                  <a16:creationId xmlns:a16="http://schemas.microsoft.com/office/drawing/2014/main" id="{CA37B366-497E-4CB8-A678-A770CE2BD873}"/>
+                  <a16:creationId xmlns:a16="http://schemas.microsoft.com/office/drawing/2014/main" id="{1D2B8B50-3419-41ED-9A9F-3CF9EEBBD3F2}"/>
                 </a:ext>
                 <a:ext uri="{C183D7F6-B498-43B3-948B-1728B52AA6E4}">
                   <adec:decorative xmlns:adec="http://schemas.microsoft.com/office/drawing/2017/decorative" val="1"/>
@@ -10656,10 +10968,10 @@
         </p:sp>
         <p:sp>
           <p:nvSpPr>
-            <p:cNvPr id="18" name="Rectangle 27">
+            <p:cNvPr id="16" name="Rectangle 27">
               <a:extLst>
                 <a:ext uri="{FF2B5EF4-FFF2-40B4-BE49-F238E27FC236}">
-                  <a16:creationId xmlns:a16="http://schemas.microsoft.com/office/drawing/2014/main" id="{CF707EDC-52B2-4D5C-8EC3-71C66EE8B3F4}"/>
+                  <a16:creationId xmlns:a16="http://schemas.microsoft.com/office/drawing/2014/main" id="{5C640498-2E73-4FA2-BEB6-C3596A458C8A}"/>
                 </a:ext>
                 <a:ext uri="{C183D7F6-B498-43B3-948B-1728B52AA6E4}">
                   <adec:decorative xmlns:adec="http://schemas.microsoft.com/office/drawing/2017/decorative" val="1"/>
@@ -10735,10 +11047,10 @@
         </p:sp>
         <p:sp>
           <p:nvSpPr>
-            <p:cNvPr id="19" name="Rectangle 28">
+            <p:cNvPr id="17" name="Rectangle 28">
               <a:extLst>
                 <a:ext uri="{FF2B5EF4-FFF2-40B4-BE49-F238E27FC236}">
-                  <a16:creationId xmlns:a16="http://schemas.microsoft.com/office/drawing/2014/main" id="{BF8E2DE7-7466-4EDF-8D69-BCA91A88D360}"/>
+                  <a16:creationId xmlns:a16="http://schemas.microsoft.com/office/drawing/2014/main" id="{3240EEFC-4112-4C39-A816-C815774F6D69}"/>
                 </a:ext>
                 <a:ext uri="{C183D7F6-B498-43B3-948B-1728B52AA6E4}">
                   <adec:decorative xmlns:adec="http://schemas.microsoft.com/office/drawing/2017/decorative" val="1"/>
@@ -10815,10 +11127,10 @@
         </p:sp>
         <p:sp>
           <p:nvSpPr>
-            <p:cNvPr id="20" name="Rectangle 29">
+            <p:cNvPr id="18" name="Rectangle 29">
               <a:extLst>
                 <a:ext uri="{FF2B5EF4-FFF2-40B4-BE49-F238E27FC236}">
-                  <a16:creationId xmlns:a16="http://schemas.microsoft.com/office/drawing/2014/main" id="{229C2E15-76CD-409E-9D6B-10DAD8881EAB}"/>
+                  <a16:creationId xmlns:a16="http://schemas.microsoft.com/office/drawing/2014/main" id="{ADF362B0-03EA-4800-9FAA-9F128587E428}"/>
                 </a:ext>
                 <a:ext uri="{C183D7F6-B498-43B3-948B-1728B52AA6E4}">
                   <adec:decorative xmlns:adec="http://schemas.microsoft.com/office/drawing/2017/decorative" val="1"/>
@@ -10893,10 +11205,10 @@
         </p:sp>
         <p:sp>
           <p:nvSpPr>
-            <p:cNvPr id="21" name="Isosceles Triangle 20">
+            <p:cNvPr id="19" name="Isosceles Triangle 18">
               <a:extLst>
                 <a:ext uri="{FF2B5EF4-FFF2-40B4-BE49-F238E27FC236}">
-                  <a16:creationId xmlns:a16="http://schemas.microsoft.com/office/drawing/2014/main" id="{89A24369-AC96-4A98-AD98-47A7217ECCE5}"/>
+                  <a16:creationId xmlns:a16="http://schemas.microsoft.com/office/drawing/2014/main" id="{0BA84559-2F4C-4795-9246-4C563F942DB9}"/>
                 </a:ext>
                 <a:ext uri="{C183D7F6-B498-43B3-948B-1728B52AA6E4}">
                   <adec:decorative xmlns:adec="http://schemas.microsoft.com/office/drawing/2017/decorative" val="1"/>
@@ -10949,10 +11261,10 @@
         </p:sp>
         <p:sp>
           <p:nvSpPr>
-            <p:cNvPr id="22" name="Isosceles Triangle 21">
+            <p:cNvPr id="20" name="Isosceles Triangle 19">
               <a:extLst>
                 <a:ext uri="{FF2B5EF4-FFF2-40B4-BE49-F238E27FC236}">
-                  <a16:creationId xmlns:a16="http://schemas.microsoft.com/office/drawing/2014/main" id="{7D0DF9A3-4628-42F6-B0A4-44D97617E0E5}"/>
+                  <a16:creationId xmlns:a16="http://schemas.microsoft.com/office/drawing/2014/main" id="{FA77A1AA-CA47-4A91-A0A1-0A8CE31A985E}"/>
                 </a:ext>
                 <a:ext uri="{C183D7F6-B498-43B3-948B-1728B52AA6E4}">
                   <adec:decorative xmlns:adec="http://schemas.microsoft.com/office/drawing/2017/decorative" val="1"/>
@@ -11006,10 +11318,10 @@
       </p:grpSp>
       <p:sp>
         <p:nvSpPr>
-          <p:cNvPr id="24" name="Rectangle 23">
+          <p:cNvPr id="22" name="Rectangle 21">
             <a:extLst>
               <a:ext uri="{FF2B5EF4-FFF2-40B4-BE49-F238E27FC236}">
-                <a16:creationId xmlns:a16="http://schemas.microsoft.com/office/drawing/2014/main" id="{7459C506-5F4B-4B75-9218-C7C3F87FA8D3}"/>
+                <a16:creationId xmlns:a16="http://schemas.microsoft.com/office/drawing/2014/main" id="{03E8462A-FEBA-4848-81CC-3F8DA3E477BE}"/>
               </a:ext>
               <a:ext uri="{C183D7F6-B498-43B3-948B-1728B52AA6E4}">
                 <adec:decorative xmlns:adec="http://schemas.microsoft.com/office/drawing/2017/decorative" val="1"/>
@@ -11030,11 +11342,14 @@
         <p:spPr>
           <a:xfrm>
             <a:off x="0" y="0"/>
-            <a:ext cx="12192000" cy="6858000"/>
+            <a:ext cx="12188952" cy="6858000"/>
           </a:xfrm>
           <a:prstGeom prst="rect">
             <a:avLst/>
           </a:prstGeom>
+          <a:solidFill>
+            <a:schemeClr val="accent2"/>
+          </a:solidFill>
           <a:ln>
             <a:noFill/>
           </a:ln>
@@ -11066,10 +11381,10 @@
       </p:sp>
       <p:grpSp>
         <p:nvGrpSpPr>
-          <p:cNvPr id="26" name="Group 25">
+          <p:cNvPr id="46" name="Group 23">
             <a:extLst>
               <a:ext uri="{FF2B5EF4-FFF2-40B4-BE49-F238E27FC236}">
-                <a16:creationId xmlns:a16="http://schemas.microsoft.com/office/drawing/2014/main" id="{BC659EEB-C3AE-4544-8263-417009DCDF41}"/>
+                <a16:creationId xmlns:a16="http://schemas.microsoft.com/office/drawing/2014/main" id="{2109F83F-40FE-4DB3-84CC-09FB3340D06D}"/>
               </a:ext>
               <a:ext uri="{C183D7F6-B498-43B3-948B-1728B52AA6E4}">
                 <adec:decorative xmlns:adec="http://schemas.microsoft.com/office/drawing/2017/decorative" val="1"/>
@@ -11097,10 +11412,10 @@
         </p:grpSpPr>
         <p:cxnSp>
           <p:nvCxnSpPr>
-            <p:cNvPr id="27" name="Straight Connector 26">
+            <p:cNvPr id="25" name="Straight Connector 24">
               <a:extLst>
                 <a:ext uri="{FF2B5EF4-FFF2-40B4-BE49-F238E27FC236}">
-                  <a16:creationId xmlns:a16="http://schemas.microsoft.com/office/drawing/2014/main" id="{D99DB6C6-36F9-4576-A558-95153EADBE41}"/>
+                  <a16:creationId xmlns:a16="http://schemas.microsoft.com/office/drawing/2014/main" id="{1DE492D7-C3C3-48FF-80C8-37021EA0262F}"/>
                 </a:ext>
                 <a:ext uri="{C183D7F6-B498-43B3-948B-1728B52AA6E4}">
                   <adec:decorative xmlns:adec="http://schemas.microsoft.com/office/drawing/2017/decorative" val="1"/>
@@ -11149,10 +11464,10 @@
         </p:cxnSp>
         <p:sp>
           <p:nvSpPr>
-            <p:cNvPr id="28" name="Rectangle 23">
+            <p:cNvPr id="26" name="Rectangle 23">
               <a:extLst>
                 <a:ext uri="{FF2B5EF4-FFF2-40B4-BE49-F238E27FC236}">
-                  <a16:creationId xmlns:a16="http://schemas.microsoft.com/office/drawing/2014/main" id="{694E7916-EDE4-4B50-A4A1-6B28FDD4D9B9}"/>
+                  <a16:creationId xmlns:a16="http://schemas.microsoft.com/office/drawing/2014/main" id="{0B30FF97-2E9A-490A-AED2-90BA2E0EC17F}"/>
                 </a:ext>
                 <a:ext uri="{C183D7F6-B498-43B3-948B-1728B52AA6E4}">
                   <adec:decorative xmlns:adec="http://schemas.microsoft.com/office/drawing/2017/decorative" val="1"/>
@@ -11227,10 +11542,10 @@
         </p:sp>
         <p:sp>
           <p:nvSpPr>
-            <p:cNvPr id="29" name="Rectangle 25">
+            <p:cNvPr id="27" name="Rectangle 25">
               <a:extLst>
                 <a:ext uri="{FF2B5EF4-FFF2-40B4-BE49-F238E27FC236}">
-                  <a16:creationId xmlns:a16="http://schemas.microsoft.com/office/drawing/2014/main" id="{6F6CB7BB-4370-4173-97F8-F636C0F149F1}"/>
+                  <a16:creationId xmlns:a16="http://schemas.microsoft.com/office/drawing/2014/main" id="{B6D53C7D-A312-47B6-A66A-230A19CFACA6}"/>
                 </a:ext>
                 <a:ext uri="{C183D7F6-B498-43B3-948B-1728B52AA6E4}">
                   <adec:decorative xmlns:adec="http://schemas.microsoft.com/office/drawing/2017/decorative" val="1"/>
@@ -11305,10 +11620,10 @@
         </p:sp>
         <p:sp>
           <p:nvSpPr>
-            <p:cNvPr id="30" name="Isosceles Triangle 29">
+            <p:cNvPr id="28" name="Isosceles Triangle 27">
               <a:extLst>
                 <a:ext uri="{FF2B5EF4-FFF2-40B4-BE49-F238E27FC236}">
-                  <a16:creationId xmlns:a16="http://schemas.microsoft.com/office/drawing/2014/main" id="{B0F590BB-1F51-4138-A2D4-2E483C84FB07}"/>
+                  <a16:creationId xmlns:a16="http://schemas.microsoft.com/office/drawing/2014/main" id="{9329D58C-0D2E-4A2B-AD6A-9CEE506784A8}"/>
                 </a:ext>
                 <a:ext uri="{C183D7F6-B498-43B3-948B-1728B52AA6E4}">
                   <adec:decorative xmlns:adec="http://schemas.microsoft.com/office/drawing/2017/decorative" val="1"/>
@@ -11361,10 +11676,10 @@
         </p:sp>
         <p:sp>
           <p:nvSpPr>
-            <p:cNvPr id="31" name="Rectangle 27">
+            <p:cNvPr id="29" name="Rectangle 27">
               <a:extLst>
                 <a:ext uri="{FF2B5EF4-FFF2-40B4-BE49-F238E27FC236}">
-                  <a16:creationId xmlns:a16="http://schemas.microsoft.com/office/drawing/2014/main" id="{4A492863-9797-45A2-BAB3-514F10C5F254}"/>
+                  <a16:creationId xmlns:a16="http://schemas.microsoft.com/office/drawing/2014/main" id="{9D446EDE-C690-4461-8BF2-7634808FC8B4}"/>
                 </a:ext>
                 <a:ext uri="{C183D7F6-B498-43B3-948B-1728B52AA6E4}">
                   <adec:decorative xmlns:adec="http://schemas.microsoft.com/office/drawing/2017/decorative" val="1"/>
@@ -11440,10 +11755,10 @@
         </p:sp>
         <p:sp>
           <p:nvSpPr>
-            <p:cNvPr id="32" name="Rectangle 28">
+            <p:cNvPr id="30" name="Rectangle 28">
               <a:extLst>
                 <a:ext uri="{FF2B5EF4-FFF2-40B4-BE49-F238E27FC236}">
-                  <a16:creationId xmlns:a16="http://schemas.microsoft.com/office/drawing/2014/main" id="{7C1E33F6-6D0F-4ECF-92F4-6F71D8BAF3D9}"/>
+                  <a16:creationId xmlns:a16="http://schemas.microsoft.com/office/drawing/2014/main" id="{323F3D34-6531-4AD7-A8C6-195A090281A1}"/>
                 </a:ext>
                 <a:ext uri="{C183D7F6-B498-43B3-948B-1728B52AA6E4}">
                   <adec:decorative xmlns:adec="http://schemas.microsoft.com/office/drawing/2017/decorative" val="1"/>
@@ -11520,10 +11835,10 @@
         </p:sp>
         <p:sp>
           <p:nvSpPr>
-            <p:cNvPr id="33" name="Rectangle 29">
+            <p:cNvPr id="31" name="Rectangle 29">
               <a:extLst>
                 <a:ext uri="{FF2B5EF4-FFF2-40B4-BE49-F238E27FC236}">
-                  <a16:creationId xmlns:a16="http://schemas.microsoft.com/office/drawing/2014/main" id="{73EEEA64-7411-474B-BD0E-60C24B3F4E56}"/>
+                  <a16:creationId xmlns:a16="http://schemas.microsoft.com/office/drawing/2014/main" id="{B9B0AE3F-2350-435F-A9B0-C310BF876385}"/>
                 </a:ext>
                 <a:ext uri="{C183D7F6-B498-43B3-948B-1728B52AA6E4}">
                   <adec:decorative xmlns:adec="http://schemas.microsoft.com/office/drawing/2017/decorative" val="1"/>
@@ -11598,10 +11913,10 @@
         </p:sp>
         <p:sp>
           <p:nvSpPr>
-            <p:cNvPr id="34" name="Isosceles Triangle 33">
+            <p:cNvPr id="32" name="Isosceles Triangle 31">
               <a:extLst>
                 <a:ext uri="{FF2B5EF4-FFF2-40B4-BE49-F238E27FC236}">
-                  <a16:creationId xmlns:a16="http://schemas.microsoft.com/office/drawing/2014/main" id="{4F82A6DD-92BB-4443-B5A5-05240DD5580E}"/>
+                  <a16:creationId xmlns:a16="http://schemas.microsoft.com/office/drawing/2014/main" id="{4EFA655C-9E50-4C14-A89E-AD7B648E4E2B}"/>
                 </a:ext>
                 <a:ext uri="{C183D7F6-B498-43B3-948B-1728B52AA6E4}">
                   <adec:decorative xmlns:adec="http://schemas.microsoft.com/office/drawing/2017/decorative" val="1"/>
@@ -11654,10 +11969,10 @@
         </p:sp>
         <p:sp>
           <p:nvSpPr>
-            <p:cNvPr id="35" name="Isosceles Triangle 34">
+            <p:cNvPr id="33" name="Isosceles Triangle 32">
               <a:extLst>
                 <a:ext uri="{FF2B5EF4-FFF2-40B4-BE49-F238E27FC236}">
-                  <a16:creationId xmlns:a16="http://schemas.microsoft.com/office/drawing/2014/main" id="{79832BCB-1DCF-46AC-9FFA-170791668D8C}"/>
+                  <a16:creationId xmlns:a16="http://schemas.microsoft.com/office/drawing/2014/main" id="{3E843863-7D25-4C01-9A17-E817CB6D998A}"/>
                 </a:ext>
                 <a:ext uri="{C183D7F6-B498-43B3-948B-1728B52AA6E4}">
                   <adec:decorative xmlns:adec="http://schemas.microsoft.com/office/drawing/2017/decorative" val="1"/>
@@ -11709,12 +12024,12 @@
           </p:style>
         </p:sp>
       </p:grpSp>
-      <p:sp useBgFill="1">
+      <p:sp>
         <p:nvSpPr>
-          <p:cNvPr id="37" name="Rectangle 36">
+          <p:cNvPr id="35" name="Rectangle 34">
             <a:extLst>
               <a:ext uri="{FF2B5EF4-FFF2-40B4-BE49-F238E27FC236}">
-                <a16:creationId xmlns:a16="http://schemas.microsoft.com/office/drawing/2014/main" id="{4E74DA95-CD7A-4D5E-9D27-67A759CE708D}"/>
+                <a16:creationId xmlns:a16="http://schemas.microsoft.com/office/drawing/2014/main" id="{7941F9B1-B01B-4A84-89D9-B169AEB4E456}"/>
               </a:ext>
               <a:ext uri="{C183D7F6-B498-43B3-948B-1728B52AA6E4}">
                 <adec:decorative xmlns:adec="http://schemas.microsoft.com/office/drawing/2017/decorative" val="1"/>
@@ -11740,11 +12055,19 @@
           <a:prstGeom prst="rect">
             <a:avLst/>
           </a:prstGeom>
-          <a:ln w="22225">
-            <a:solidFill>
-              <a:srgbClr val="FFFFFF"/>
-            </a:solidFill>
+          <a:solidFill>
+            <a:srgbClr val="FFFFFF"/>
+          </a:solidFill>
+          <a:ln w="9525">
+            <a:noFill/>
           </a:ln>
+          <a:effectLst>
+            <a:outerShdw blurRad="63500" dist="17780" dir="5400000" algn="t" rotWithShape="0">
+              <a:prstClr val="black">
+                <a:alpha val="43000"/>
+              </a:prstClr>
+            </a:outerShdw>
+          </a:effectLst>
         </p:spPr>
         <p:style>
           <a:lnRef idx="2">
@@ -11773,10 +12096,106 @@
       </p:sp>
       <p:pic>
         <p:nvPicPr>
-          <p:cNvPr id="5" name="Picture 4" descr="Chart, diagram&#10;&#10;Description automatically generated">
+          <p:cNvPr id="5" name="Content Placeholder 4">
             <a:extLst>
               <a:ext uri="{FF2B5EF4-FFF2-40B4-BE49-F238E27FC236}">
-                <a16:creationId xmlns:a16="http://schemas.microsoft.com/office/drawing/2014/main" id="{B11B2CF6-FA48-A7E3-C794-E035C7E617B9}"/>
+                <a16:creationId xmlns:a16="http://schemas.microsoft.com/office/drawing/2014/main" id="{ACB12D54-5309-B457-937B-F296AF92B3CC}"/>
+              </a:ext>
+            </a:extLst>
+          </p:cNvPr>
+          <p:cNvPicPr>
+            <a:picLocks noGrp="1" noChangeAspect="1"/>
+          </p:cNvPicPr>
+          <p:nvPr>
+            <p:ph idx="1"/>
+          </p:nvPr>
+        </p:nvPicPr>
+        <p:blipFill>
+          <a:blip r:embed="rId2"/>
+          <a:stretch>
+            <a:fillRect/>
+          </a:stretch>
+        </p:blipFill>
+        <p:spPr>
+          <a:xfrm>
+            <a:off x="489002" y="966542"/>
+            <a:ext cx="11135581" cy="4704783"/>
+          </a:xfrm>
+          <a:prstGeom prst="rect">
+            <a:avLst/>
+          </a:prstGeom>
+        </p:spPr>
+      </p:pic>
+    </p:spTree>
+    <p:extLst>
+      <p:ext uri="{BB962C8B-B14F-4D97-AF65-F5344CB8AC3E}">
+        <p14:creationId xmlns:p14="http://schemas.microsoft.com/office/powerpoint/2010/main" val="1352352412"/>
+      </p:ext>
+    </p:extLst>
+  </p:cSld>
+  <p:clrMapOvr>
+    <a:masterClrMapping/>
+  </p:clrMapOvr>
+</p:sld>
+</file>
+
+<file path=ppt/slides/slide9.xml><?xml version="1.0" encoding="utf-8"?>
+<p:sld xmlns:a="http://schemas.openxmlformats.org/drawingml/2006/main" xmlns:r="http://schemas.openxmlformats.org/officeDocument/2006/relationships" xmlns:p="http://schemas.openxmlformats.org/presentationml/2006/main">
+  <p:cSld>
+    <p:spTree>
+      <p:nvGrpSpPr>
+        <p:cNvPr id="1" name=""/>
+        <p:cNvGrpSpPr/>
+        <p:nvPr/>
+      </p:nvGrpSpPr>
+      <p:grpSpPr>
+        <a:xfrm>
+          <a:off x="0" y="0"/>
+          <a:ext cx="0" cy="0"/>
+          <a:chOff x="0" y="0"/>
+          <a:chExt cx="0" cy="0"/>
+        </a:xfrm>
+      </p:grpSpPr>
+      <p:sp>
+        <p:nvSpPr>
+          <p:cNvPr id="2" name="Title 1">
+            <a:extLst>
+              <a:ext uri="{FF2B5EF4-FFF2-40B4-BE49-F238E27FC236}">
+                <a16:creationId xmlns:a16="http://schemas.microsoft.com/office/drawing/2014/main" id="{8D785F74-FC79-2CF9-2C01-346BB33AA500}"/>
+              </a:ext>
+            </a:extLst>
+          </p:cNvPr>
+          <p:cNvSpPr>
+            <a:spLocks noGrp="1"/>
+          </p:cNvSpPr>
+          <p:nvPr>
+            <p:ph type="title"/>
+          </p:nvPr>
+        </p:nvSpPr>
+        <p:spPr>
+          <a:xfrm>
+            <a:off x="658481" y="213674"/>
+            <a:ext cx="8596668" cy="1320800"/>
+          </a:xfrm>
+        </p:spPr>
+        <p:txBody>
+          <a:bodyPr/>
+          <a:lstStyle/>
+          <a:p>
+            <a:r>
+              <a:rPr lang="en-US" dirty="0"/>
+              <a:t>Schematic</a:t>
+            </a:r>
+            <a:endParaRPr lang="hu-HU" dirty="0"/>
+          </a:p>
+        </p:txBody>
+      </p:sp>
+      <p:pic>
+        <p:nvPicPr>
+          <p:cNvPr id="5" name="Picture 4">
+            <a:extLst>
+              <a:ext uri="{FF2B5EF4-FFF2-40B4-BE49-F238E27FC236}">
+                <a16:creationId xmlns:a16="http://schemas.microsoft.com/office/drawing/2014/main" id="{C2346F68-B02B-DEB4-9835-99D847851571}"/>
               </a:ext>
             </a:extLst>
           </p:cNvPr>
@@ -11786,114 +12205,61 @@
           <p:nvPr/>
         </p:nvPicPr>
         <p:blipFill>
-          <a:blip r:embed="rId2">
-            <a:extLst>
-              <a:ext uri="{28A0092B-C50C-407E-A947-70E740481C1C}">
-                <a14:useLocalDpi xmlns:a14="http://schemas.microsoft.com/office/drawing/2010/main" val="0"/>
-              </a:ext>
-            </a:extLst>
-          </a:blip>
+          <a:blip r:embed="rId2"/>
           <a:stretch>
             <a:fillRect/>
           </a:stretch>
         </p:blipFill>
         <p:spPr>
           <a:xfrm>
-            <a:off x="4750550" y="1216690"/>
-            <a:ext cx="6645336" cy="4299923"/>
+            <a:off x="886119" y="1139749"/>
+            <a:ext cx="10469301" cy="5387116"/>
           </a:xfrm>
           <a:prstGeom prst="rect">
             <a:avLst/>
           </a:prstGeom>
         </p:spPr>
       </p:pic>
-      <p:pic>
-        <p:nvPicPr>
-          <p:cNvPr id="7" name="Picture 6" descr="A window with snow outside&#10;&#10;Description automatically generated with low confidence">
+      <p:sp>
+        <p:nvSpPr>
+          <p:cNvPr id="6" name="TextBox 5">
             <a:extLst>
               <a:ext uri="{FF2B5EF4-FFF2-40B4-BE49-F238E27FC236}">
-                <a16:creationId xmlns:a16="http://schemas.microsoft.com/office/drawing/2014/main" id="{27488146-99C4-6107-5303-9ED9AE839345}"/>
+                <a16:creationId xmlns:a16="http://schemas.microsoft.com/office/drawing/2014/main" id="{0B5C02D7-5053-A5C3-B223-CC508F23A436}"/>
               </a:ext>
             </a:extLst>
           </p:cNvPr>
-          <p:cNvPicPr>
-            <a:picLocks noChangeAspect="1"/>
-          </p:cNvPicPr>
+          <p:cNvSpPr txBox="1"/>
           <p:nvPr/>
-        </p:nvPicPr>
-        <p:blipFill>
-          <a:blip r:embed="rId3">
-            <a:extLst>
-              <a:ext uri="{28A0092B-C50C-407E-A947-70E740481C1C}">
-                <a14:useLocalDpi xmlns:a14="http://schemas.microsoft.com/office/drawing/2010/main" val="0"/>
-              </a:ext>
-            </a:extLst>
-          </a:blip>
-          <a:stretch>
-            <a:fillRect/>
-          </a:stretch>
-        </p:blipFill>
+        </p:nvSpPr>
         <p:spPr>
           <a:xfrm>
-            <a:off x="626707" y="1438393"/>
-            <a:ext cx="5628178" cy="3644245"/>
+            <a:off x="5618375" y="705626"/>
+            <a:ext cx="2436886" cy="369332"/>
           </a:xfrm>
           <a:prstGeom prst="rect">
             <a:avLst/>
           </a:prstGeom>
+          <a:noFill/>
         </p:spPr>
-      </p:pic>
-      <p:cxnSp>
-        <p:nvCxnSpPr>
-          <p:cNvPr id="39" name="Straight Connector 38">
-            <a:extLst>
-              <a:ext uri="{FF2B5EF4-FFF2-40B4-BE49-F238E27FC236}">
-                <a16:creationId xmlns:a16="http://schemas.microsoft.com/office/drawing/2014/main" id="{14AA3B5C-0C55-4FFF-9C45-8F9F7C074A4E}"/>
-              </a:ext>
-              <a:ext uri="{C183D7F6-B498-43B3-948B-1728B52AA6E4}">
-                <adec:decorative xmlns:adec="http://schemas.microsoft.com/office/drawing/2017/decorative" val="1"/>
-              </a:ext>
-            </a:extLst>
-          </p:cNvPr>
-          <p:cNvCxnSpPr>
-            <a:cxnSpLocks noGrp="1" noRot="1" noChangeAspect="1" noMove="1" noResize="1" noEditPoints="1" noAdjustHandles="1" noChangeArrowheads="1" noChangeShapeType="1"/>
-          </p:cNvCxnSpPr>
-          <p:nvPr>
-            <p:extLst>
-              <p:ext uri="{386F3935-93C4-4BCD-93E2-E3B085C9AB24}">
-                <p16:designElem xmlns:p16="http://schemas.microsoft.com/office/powerpoint/2015/main" val="1"/>
-              </p:ext>
-            </p:extLst>
-          </p:nvPr>
-        </p:nvCxnSpPr>
-        <p:spPr>
-          <a:xfrm>
-            <a:off x="6081305" y="1650669"/>
-            <a:ext cx="0" cy="3431969"/>
-          </a:xfrm>
-          <a:prstGeom prst="line">
-            <a:avLst/>
-          </a:prstGeom>
-        </p:spPr>
-        <p:style>
-          <a:lnRef idx="1">
-            <a:schemeClr val="accent1"/>
-          </a:lnRef>
-          <a:fillRef idx="0">
-            <a:schemeClr val="accent1"/>
-          </a:fillRef>
-          <a:effectRef idx="0">
-            <a:schemeClr val="accent1"/>
-          </a:effectRef>
-          <a:fontRef idx="minor">
-            <a:schemeClr val="tx1"/>
-          </a:fontRef>
-        </p:style>
-      </p:cxnSp>
+        <p:txBody>
+          <a:bodyPr wrap="none" rtlCol="0">
+            <a:spAutoFit/>
+          </a:bodyPr>
+          <a:lstStyle/>
+          <a:p>
+            <a:r>
+              <a:rPr lang="en-US" dirty="0"/>
+              <a:t>Example: RF frontend</a:t>
+            </a:r>
+            <a:endParaRPr lang="hu-HU" dirty="0"/>
+          </a:p>
+        </p:txBody>
+      </p:sp>
     </p:spTree>
     <p:extLst>
       <p:ext uri="{BB962C8B-B14F-4D97-AF65-F5344CB8AC3E}">
-        <p14:creationId xmlns:p14="http://schemas.microsoft.com/office/powerpoint/2010/main" val="3614495963"/>
+        <p14:creationId xmlns:p14="http://schemas.microsoft.com/office/powerpoint/2010/main" val="3801643843"/>
       </p:ext>
     </p:extLst>
   </p:cSld>

</xml_diff>